<commit_message>
more changes to software dev evolution
</commit_message>
<xml_diff>
--- a/software-design-evolution/presentation/software-design-evolution.pptx
+++ b/software-design-evolution/presentation/software-design-evolution.pptx
@@ -1374,1088 +1374,10 @@
   <dgm:whole/>
   <dgm:extLst>
     <a:ext uri="http://schemas.microsoft.com/office/drawing/2008/diagram">
-      <dsp:dataModelExt xmlns:dsp="http://schemas.microsoft.com/office/drawing/2008/diagram" xmlns="" relId="rId6" minVer="http://schemas.openxmlformats.org/drawingml/2006/diagram"/>
+      <dsp:dataModelExt xmlns="" xmlns:dsp="http://schemas.microsoft.com/office/drawing/2008/diagram" relId="rId6" minVer="http://schemas.openxmlformats.org/drawingml/2006/diagram"/>
     </a:ext>
   </dgm:extLst>
 </dgm:dataModel>
-</file>
-
-<file path=ppt/diagrams/drawing1.xml><?xml version="1.0" encoding="utf-8"?>
-<dsp:drawing xmlns:dgm="http://schemas.openxmlformats.org/drawingml/2006/diagram" xmlns:a="http://schemas.openxmlformats.org/drawingml/2006/main" xmlns:dsp="http://schemas.microsoft.com/office/drawing/2008/diagram">
-  <dsp:spTree>
-    <dsp:nvGrpSpPr>
-      <dsp:cNvPr id="0" name=""/>
-      <dsp:cNvGrpSpPr/>
-    </dsp:nvGrpSpPr>
-    <dsp:grpSpPr/>
-    <dsp:sp modelId="{FE31840E-C97B-42A1-AB85-D6ABDA076DDD}">
-      <dsp:nvSpPr>
-        <dsp:cNvPr id="0" name=""/>
-        <dsp:cNvSpPr/>
-      </dsp:nvSpPr>
-      <dsp:spPr>
-        <a:xfrm>
-          <a:off x="3119332" y="2208807"/>
-          <a:ext cx="2371934" cy="2453736"/>
-        </a:xfrm>
-        <a:prstGeom prst="ellipse">
-          <a:avLst/>
-        </a:prstGeom>
-        <a:gradFill rotWithShape="0">
-          <a:gsLst>
-            <a:gs pos="0">
-              <a:schemeClr val="accent1">
-                <a:hueOff val="0"/>
-                <a:satOff val="0"/>
-                <a:lumOff val="0"/>
-                <a:alphaOff val="0"/>
-                <a:tint val="30000"/>
-                <a:satMod val="250000"/>
-              </a:schemeClr>
-            </a:gs>
-            <a:gs pos="72000">
-              <a:schemeClr val="accent1">
-                <a:hueOff val="0"/>
-                <a:satOff val="0"/>
-                <a:lumOff val="0"/>
-                <a:alphaOff val="0"/>
-                <a:tint val="75000"/>
-                <a:satMod val="210000"/>
-              </a:schemeClr>
-            </a:gs>
-            <a:gs pos="100000">
-              <a:schemeClr val="accent1">
-                <a:hueOff val="0"/>
-                <a:satOff val="0"/>
-                <a:lumOff val="0"/>
-                <a:alphaOff val="0"/>
-                <a:tint val="85000"/>
-                <a:satMod val="210000"/>
-              </a:schemeClr>
-            </a:gs>
-          </a:gsLst>
-          <a:lin ang="5400000" scaled="1"/>
-        </a:gradFill>
-        <a:ln>
-          <a:noFill/>
-        </a:ln>
-        <a:effectLst>
-          <a:outerShdw blurRad="76200" dist="50800" dir="5400000" rotWithShape="0">
-            <a:srgbClr val="4E3B30">
-              <a:alpha val="60000"/>
-            </a:srgbClr>
-          </a:outerShdw>
-        </a:effectLst>
-        <a:scene3d>
-          <a:camera prst="orthographicFront"/>
-          <a:lightRig rig="flat" dir="t"/>
-        </a:scene3d>
-        <a:sp3d prstMaterial="dkEdge">
-          <a:bevelT w="8200" h="38100"/>
-        </a:sp3d>
-      </dsp:spPr>
-      <dsp:style>
-        <a:lnRef idx="0">
-          <a:scrgbClr r="0" g="0" b="0"/>
-        </a:lnRef>
-        <a:fillRef idx="2">
-          <a:scrgbClr r="0" g="0" b="0"/>
-        </a:fillRef>
-        <a:effectRef idx="1">
-          <a:scrgbClr r="0" g="0" b="0"/>
-        </a:effectRef>
-        <a:fontRef idx="minor">
-          <a:schemeClr val="dk1"/>
-        </a:fontRef>
-      </dsp:style>
-      <dsp:txBody>
-        <a:bodyPr spcFirstLastPara="0" vert="horz" wrap="square" lIns="13970" tIns="13970" rIns="13970" bIns="13970" numCol="1" spcCol="1270" anchor="ctr" anchorCtr="0">
-          <a:noAutofit/>
-        </a:bodyPr>
-        <a:lstStyle/>
-        <a:p>
-          <a:pPr lvl="0" algn="ctr" defTabSz="977900">
-            <a:lnSpc>
-              <a:spcPct val="90000"/>
-            </a:lnSpc>
-            <a:spcBef>
-              <a:spcPct val="0"/>
-            </a:spcBef>
-            <a:spcAft>
-              <a:spcPct val="35000"/>
-            </a:spcAft>
-          </a:pPr>
-          <a:r>
-            <a:rPr lang="en-US" sz="2200" kern="1200" dirty="0" smtClean="0"/>
-            <a:t>Behavior Driven Development</a:t>
-          </a:r>
-          <a:endParaRPr lang="en-US" sz="2200" kern="1200" dirty="0"/>
-        </a:p>
-      </dsp:txBody>
-      <dsp:txXfrm>
-        <a:off x="3119332" y="2208807"/>
-        <a:ext cx="2371934" cy="2453736"/>
-      </dsp:txXfrm>
-    </dsp:sp>
-    <dsp:sp modelId="{1A6F4086-0722-4799-914E-21F49CF79C35}">
-      <dsp:nvSpPr>
-        <dsp:cNvPr id="0" name=""/>
-        <dsp:cNvSpPr/>
-      </dsp:nvSpPr>
-      <dsp:spPr>
-        <a:xfrm rot="16200000">
-          <a:off x="4159764" y="2043498"/>
-          <a:ext cx="291071" cy="39547"/>
-        </a:xfrm>
-        <a:custGeom>
-          <a:avLst/>
-          <a:gdLst/>
-          <a:ahLst/>
-          <a:cxnLst/>
-          <a:rect l="0" t="0" r="0" b="0"/>
-          <a:pathLst>
-            <a:path>
-              <a:moveTo>
-                <a:pt x="0" y="19773"/>
-              </a:moveTo>
-              <a:lnTo>
-                <a:pt x="291071" y="19773"/>
-              </a:lnTo>
-            </a:path>
-          </a:pathLst>
-        </a:custGeom>
-        <a:noFill/>
-        <a:ln w="25400" cap="flat" cmpd="sng" algn="ctr">
-          <a:solidFill>
-            <a:schemeClr val="accent1">
-              <a:shade val="60000"/>
-              <a:hueOff val="0"/>
-              <a:satOff val="0"/>
-              <a:lumOff val="0"/>
-              <a:alphaOff val="0"/>
-            </a:schemeClr>
-          </a:solidFill>
-          <a:prstDash val="solid"/>
-        </a:ln>
-        <a:effectLst/>
-      </dsp:spPr>
-      <dsp:style>
-        <a:lnRef idx="2">
-          <a:scrgbClr r="0" g="0" b="0"/>
-        </a:lnRef>
-        <a:fillRef idx="0">
-          <a:scrgbClr r="0" g="0" b="0"/>
-        </a:fillRef>
-        <a:effectRef idx="0">
-          <a:scrgbClr r="0" g="0" b="0"/>
-        </a:effectRef>
-        <a:fontRef idx="minor"/>
-      </dsp:style>
-      <dsp:txBody>
-        <a:bodyPr spcFirstLastPara="0" vert="horz" wrap="square" lIns="12700" tIns="0" rIns="12700" bIns="0" numCol="1" spcCol="1270" anchor="ctr" anchorCtr="0">
-          <a:noAutofit/>
-        </a:bodyPr>
-        <a:lstStyle/>
-        <a:p>
-          <a:pPr lvl="0" algn="ctr" defTabSz="222250">
-            <a:lnSpc>
-              <a:spcPct val="90000"/>
-            </a:lnSpc>
-            <a:spcBef>
-              <a:spcPct val="0"/>
-            </a:spcBef>
-            <a:spcAft>
-              <a:spcPct val="35000"/>
-            </a:spcAft>
-          </a:pPr>
-          <a:endParaRPr lang="en-US" sz="500" kern="1200"/>
-        </a:p>
-      </dsp:txBody>
-      <dsp:txXfrm rot="16200000">
-        <a:off x="4298023" y="2055995"/>
-        <a:ext cx="14553" cy="14553"/>
-      </dsp:txXfrm>
-    </dsp:sp>
-    <dsp:sp modelId="{4680DD82-8218-4AE8-936F-0B118784B2BF}">
-      <dsp:nvSpPr>
-        <dsp:cNvPr id="0" name=""/>
-        <dsp:cNvSpPr/>
-      </dsp:nvSpPr>
-      <dsp:spPr>
-        <a:xfrm>
-          <a:off x="3359401" y="25939"/>
-          <a:ext cx="1891796" cy="1891796"/>
-        </a:xfrm>
-        <a:prstGeom prst="ellipse">
-          <a:avLst/>
-        </a:prstGeom>
-        <a:gradFill rotWithShape="0">
-          <a:gsLst>
-            <a:gs pos="0">
-              <a:schemeClr val="accent1">
-                <a:hueOff val="0"/>
-                <a:satOff val="0"/>
-                <a:lumOff val="0"/>
-                <a:alphaOff val="0"/>
-                <a:tint val="30000"/>
-                <a:satMod val="250000"/>
-              </a:schemeClr>
-            </a:gs>
-            <a:gs pos="72000">
-              <a:schemeClr val="accent1">
-                <a:hueOff val="0"/>
-                <a:satOff val="0"/>
-                <a:lumOff val="0"/>
-                <a:alphaOff val="0"/>
-                <a:tint val="75000"/>
-                <a:satMod val="210000"/>
-              </a:schemeClr>
-            </a:gs>
-            <a:gs pos="100000">
-              <a:schemeClr val="accent1">
-                <a:hueOff val="0"/>
-                <a:satOff val="0"/>
-                <a:lumOff val="0"/>
-                <a:alphaOff val="0"/>
-                <a:tint val="85000"/>
-                <a:satMod val="210000"/>
-              </a:schemeClr>
-            </a:gs>
-          </a:gsLst>
-          <a:lin ang="5400000" scaled="1"/>
-        </a:gradFill>
-        <a:ln>
-          <a:noFill/>
-        </a:ln>
-        <a:effectLst>
-          <a:outerShdw blurRad="76200" dist="50800" dir="5400000" rotWithShape="0">
-            <a:srgbClr val="4E3B30">
-              <a:alpha val="60000"/>
-            </a:srgbClr>
-          </a:outerShdw>
-        </a:effectLst>
-        <a:scene3d>
-          <a:camera prst="orthographicFront"/>
-          <a:lightRig rig="flat" dir="t"/>
-        </a:scene3d>
-        <a:sp3d prstMaterial="dkEdge">
-          <a:bevelT w="8200" h="38100"/>
-        </a:sp3d>
-      </dsp:spPr>
-      <dsp:style>
-        <a:lnRef idx="0">
-          <a:scrgbClr r="0" g="0" b="0"/>
-        </a:lnRef>
-        <a:fillRef idx="2">
-          <a:scrgbClr r="0" g="0" b="0"/>
-        </a:fillRef>
-        <a:effectRef idx="1">
-          <a:scrgbClr r="0" g="0" b="0"/>
-        </a:effectRef>
-        <a:fontRef idx="minor">
-          <a:schemeClr val="dk1"/>
-        </a:fontRef>
-      </dsp:style>
-      <dsp:txBody>
-        <a:bodyPr spcFirstLastPara="0" vert="horz" wrap="square" lIns="13335" tIns="13335" rIns="13335" bIns="13335" numCol="1" spcCol="1270" anchor="ctr" anchorCtr="0">
-          <a:noAutofit/>
-        </a:bodyPr>
-        <a:lstStyle/>
-        <a:p>
-          <a:pPr lvl="0" algn="ctr" defTabSz="933450">
-            <a:lnSpc>
-              <a:spcPct val="90000"/>
-            </a:lnSpc>
-            <a:spcBef>
-              <a:spcPct val="0"/>
-            </a:spcBef>
-            <a:spcAft>
-              <a:spcPct val="35000"/>
-            </a:spcAft>
-          </a:pPr>
-          <a:r>
-            <a:rPr lang="en-US" sz="2100" kern="1200" dirty="0" smtClean="0"/>
-            <a:t>Ubiquitous</a:t>
-          </a:r>
-        </a:p>
-        <a:p>
-          <a:pPr lvl="0" algn="ctr" defTabSz="933450">
-            <a:lnSpc>
-              <a:spcPct val="90000"/>
-            </a:lnSpc>
-            <a:spcBef>
-              <a:spcPct val="0"/>
-            </a:spcBef>
-            <a:spcAft>
-              <a:spcPct val="35000"/>
-            </a:spcAft>
-          </a:pPr>
-          <a:r>
-            <a:rPr lang="en-US" sz="2100" kern="1200" dirty="0" smtClean="0"/>
-            <a:t>Language</a:t>
-          </a:r>
-          <a:endParaRPr lang="en-US" sz="2100" kern="1200" dirty="0"/>
-        </a:p>
-      </dsp:txBody>
-      <dsp:txXfrm>
-        <a:off x="3359401" y="25939"/>
-        <a:ext cx="1891796" cy="1891796"/>
-      </dsp:txXfrm>
-    </dsp:sp>
-    <dsp:sp modelId="{33BC7212-657C-467F-A281-FA0FCD3CC67F}">
-      <dsp:nvSpPr>
-        <dsp:cNvPr id="0" name=""/>
-        <dsp:cNvSpPr/>
-      </dsp:nvSpPr>
-      <dsp:spPr>
-        <a:xfrm rot="20520000">
-          <a:off x="5428736" y="2997549"/>
-          <a:ext cx="328241" cy="39547"/>
-        </a:xfrm>
-        <a:custGeom>
-          <a:avLst/>
-          <a:gdLst/>
-          <a:ahLst/>
-          <a:cxnLst/>
-          <a:rect l="0" t="0" r="0" b="0"/>
-          <a:pathLst>
-            <a:path>
-              <a:moveTo>
-                <a:pt x="0" y="19773"/>
-              </a:moveTo>
-              <a:lnTo>
-                <a:pt x="328241" y="19773"/>
-              </a:lnTo>
-            </a:path>
-          </a:pathLst>
-        </a:custGeom>
-        <a:noFill/>
-        <a:ln w="25400" cap="flat" cmpd="sng" algn="ctr">
-          <a:solidFill>
-            <a:schemeClr val="accent1">
-              <a:shade val="60000"/>
-              <a:hueOff val="0"/>
-              <a:satOff val="0"/>
-              <a:lumOff val="0"/>
-              <a:alphaOff val="0"/>
-            </a:schemeClr>
-          </a:solidFill>
-          <a:prstDash val="solid"/>
-        </a:ln>
-        <a:effectLst/>
-      </dsp:spPr>
-      <dsp:style>
-        <a:lnRef idx="2">
-          <a:scrgbClr r="0" g="0" b="0"/>
-        </a:lnRef>
-        <a:fillRef idx="0">
-          <a:scrgbClr r="0" g="0" b="0"/>
-        </a:fillRef>
-        <a:effectRef idx="0">
-          <a:scrgbClr r="0" g="0" b="0"/>
-        </a:effectRef>
-        <a:fontRef idx="minor"/>
-      </dsp:style>
-      <dsp:txBody>
-        <a:bodyPr spcFirstLastPara="0" vert="horz" wrap="square" lIns="12700" tIns="0" rIns="12700" bIns="0" numCol="1" spcCol="1270" anchor="ctr" anchorCtr="0">
-          <a:noAutofit/>
-        </a:bodyPr>
-        <a:lstStyle/>
-        <a:p>
-          <a:pPr lvl="0" algn="ctr" defTabSz="222250">
-            <a:lnSpc>
-              <a:spcPct val="90000"/>
-            </a:lnSpc>
-            <a:spcBef>
-              <a:spcPct val="0"/>
-            </a:spcBef>
-            <a:spcAft>
-              <a:spcPct val="35000"/>
-            </a:spcAft>
-          </a:pPr>
-          <a:endParaRPr lang="en-US" sz="500" kern="1200"/>
-        </a:p>
-      </dsp:txBody>
-      <dsp:txXfrm rot="20520000">
-        <a:off x="5584651" y="3009116"/>
-        <a:ext cx="16412" cy="16412"/>
-      </dsp:txXfrm>
-    </dsp:sp>
-    <dsp:sp modelId="{311C8A37-8073-4873-A29C-C05C780798E5}">
-      <dsp:nvSpPr>
-        <dsp:cNvPr id="0" name=""/>
-        <dsp:cNvSpPr/>
-      </dsp:nvSpPr>
-      <dsp:spPr>
-        <a:xfrm>
-          <a:off x="5702650" y="1728409"/>
-          <a:ext cx="1891796" cy="1891796"/>
-        </a:xfrm>
-        <a:prstGeom prst="ellipse">
-          <a:avLst/>
-        </a:prstGeom>
-        <a:gradFill rotWithShape="0">
-          <a:gsLst>
-            <a:gs pos="0">
-              <a:schemeClr val="accent1">
-                <a:hueOff val="0"/>
-                <a:satOff val="0"/>
-                <a:lumOff val="0"/>
-                <a:alphaOff val="0"/>
-                <a:tint val="30000"/>
-                <a:satMod val="250000"/>
-              </a:schemeClr>
-            </a:gs>
-            <a:gs pos="72000">
-              <a:schemeClr val="accent1">
-                <a:hueOff val="0"/>
-                <a:satOff val="0"/>
-                <a:lumOff val="0"/>
-                <a:alphaOff val="0"/>
-                <a:tint val="75000"/>
-                <a:satMod val="210000"/>
-              </a:schemeClr>
-            </a:gs>
-            <a:gs pos="100000">
-              <a:schemeClr val="accent1">
-                <a:hueOff val="0"/>
-                <a:satOff val="0"/>
-                <a:lumOff val="0"/>
-                <a:alphaOff val="0"/>
-                <a:tint val="85000"/>
-                <a:satMod val="210000"/>
-              </a:schemeClr>
-            </a:gs>
-          </a:gsLst>
-          <a:lin ang="5400000" scaled="1"/>
-        </a:gradFill>
-        <a:ln>
-          <a:noFill/>
-        </a:ln>
-        <a:effectLst>
-          <a:outerShdw blurRad="76200" dist="50800" dir="5400000" rotWithShape="0">
-            <a:srgbClr val="4E3B30">
-              <a:alpha val="60000"/>
-            </a:srgbClr>
-          </a:outerShdw>
-        </a:effectLst>
-        <a:scene3d>
-          <a:camera prst="orthographicFront"/>
-          <a:lightRig rig="flat" dir="t"/>
-        </a:scene3d>
-        <a:sp3d prstMaterial="dkEdge">
-          <a:bevelT w="8200" h="38100"/>
-        </a:sp3d>
-      </dsp:spPr>
-      <dsp:style>
-        <a:lnRef idx="0">
-          <a:scrgbClr r="0" g="0" b="0"/>
-        </a:lnRef>
-        <a:fillRef idx="2">
-          <a:scrgbClr r="0" g="0" b="0"/>
-        </a:fillRef>
-        <a:effectRef idx="1">
-          <a:scrgbClr r="0" g="0" b="0"/>
-        </a:effectRef>
-        <a:fontRef idx="minor">
-          <a:schemeClr val="dk1"/>
-        </a:fontRef>
-      </dsp:style>
-      <dsp:txBody>
-        <a:bodyPr spcFirstLastPara="0" vert="horz" wrap="square" lIns="13335" tIns="13335" rIns="13335" bIns="13335" numCol="1" spcCol="1270" anchor="ctr" anchorCtr="0">
-          <a:noAutofit/>
-        </a:bodyPr>
-        <a:lstStyle/>
-        <a:p>
-          <a:pPr lvl="0" algn="ctr" defTabSz="933450">
-            <a:lnSpc>
-              <a:spcPct val="90000"/>
-            </a:lnSpc>
-            <a:spcBef>
-              <a:spcPct val="0"/>
-            </a:spcBef>
-            <a:spcAft>
-              <a:spcPct val="35000"/>
-            </a:spcAft>
-          </a:pPr>
-          <a:r>
-            <a:rPr lang="en-US" sz="2100" kern="1200" dirty="0" smtClean="0"/>
-            <a:t>Emergent Design</a:t>
-          </a:r>
-          <a:endParaRPr lang="en-US" sz="2100" kern="1200" dirty="0"/>
-        </a:p>
-      </dsp:txBody>
-      <dsp:txXfrm>
-        <a:off x="5702650" y="1728409"/>
-        <a:ext cx="1891796" cy="1891796"/>
-      </dsp:txXfrm>
-    </dsp:sp>
-    <dsp:sp modelId="{35605BB8-6756-47AF-9BD6-1387D759E2ED}">
-      <dsp:nvSpPr>
-        <dsp:cNvPr id="0" name=""/>
-        <dsp:cNvSpPr/>
-      </dsp:nvSpPr>
-      <dsp:spPr>
-        <a:xfrm rot="3240000">
-          <a:off x="4954848" y="4520291"/>
-          <a:ext cx="305676" cy="39547"/>
-        </a:xfrm>
-        <a:custGeom>
-          <a:avLst/>
-          <a:gdLst/>
-          <a:ahLst/>
-          <a:cxnLst/>
-          <a:rect l="0" t="0" r="0" b="0"/>
-          <a:pathLst>
-            <a:path>
-              <a:moveTo>
-                <a:pt x="0" y="19773"/>
-              </a:moveTo>
-              <a:lnTo>
-                <a:pt x="305676" y="19773"/>
-              </a:lnTo>
-            </a:path>
-          </a:pathLst>
-        </a:custGeom>
-        <a:noFill/>
-        <a:ln w="25400" cap="flat" cmpd="sng" algn="ctr">
-          <a:solidFill>
-            <a:schemeClr val="accent1">
-              <a:shade val="60000"/>
-              <a:hueOff val="0"/>
-              <a:satOff val="0"/>
-              <a:lumOff val="0"/>
-              <a:alphaOff val="0"/>
-            </a:schemeClr>
-          </a:solidFill>
-          <a:prstDash val="solid"/>
-        </a:ln>
-        <a:effectLst/>
-      </dsp:spPr>
-      <dsp:style>
-        <a:lnRef idx="2">
-          <a:scrgbClr r="0" g="0" b="0"/>
-        </a:lnRef>
-        <a:fillRef idx="0">
-          <a:scrgbClr r="0" g="0" b="0"/>
-        </a:fillRef>
-        <a:effectRef idx="0">
-          <a:scrgbClr r="0" g="0" b="0"/>
-        </a:effectRef>
-        <a:fontRef idx="minor"/>
-      </dsp:style>
-      <dsp:txBody>
-        <a:bodyPr spcFirstLastPara="0" vert="horz" wrap="square" lIns="12700" tIns="0" rIns="12700" bIns="0" numCol="1" spcCol="1270" anchor="ctr" anchorCtr="0">
-          <a:noAutofit/>
-        </a:bodyPr>
-        <a:lstStyle/>
-        <a:p>
-          <a:pPr lvl="0" algn="ctr" defTabSz="222250">
-            <a:lnSpc>
-              <a:spcPct val="90000"/>
-            </a:lnSpc>
-            <a:spcBef>
-              <a:spcPct val="0"/>
-            </a:spcBef>
-            <a:spcAft>
-              <a:spcPct val="35000"/>
-            </a:spcAft>
-          </a:pPr>
-          <a:endParaRPr lang="en-US" sz="500" kern="1200"/>
-        </a:p>
-      </dsp:txBody>
-      <dsp:txXfrm rot="3240000">
-        <a:off x="5100044" y="4532423"/>
-        <a:ext cx="15283" cy="15283"/>
-      </dsp:txXfrm>
-    </dsp:sp>
-    <dsp:sp modelId="{6AB30D6C-3E38-432D-89A8-F166BDEA8BDA}">
-      <dsp:nvSpPr>
-        <dsp:cNvPr id="0" name=""/>
-        <dsp:cNvSpPr/>
-      </dsp:nvSpPr>
-      <dsp:spPr>
-        <a:xfrm>
-          <a:off x="4807608" y="4483063"/>
-          <a:ext cx="1891796" cy="1891796"/>
-        </a:xfrm>
-        <a:prstGeom prst="ellipse">
-          <a:avLst/>
-        </a:prstGeom>
-        <a:gradFill rotWithShape="0">
-          <a:gsLst>
-            <a:gs pos="0">
-              <a:schemeClr val="accent1">
-                <a:hueOff val="0"/>
-                <a:satOff val="0"/>
-                <a:lumOff val="0"/>
-                <a:alphaOff val="0"/>
-                <a:tint val="30000"/>
-                <a:satMod val="250000"/>
-              </a:schemeClr>
-            </a:gs>
-            <a:gs pos="72000">
-              <a:schemeClr val="accent1">
-                <a:hueOff val="0"/>
-                <a:satOff val="0"/>
-                <a:lumOff val="0"/>
-                <a:alphaOff val="0"/>
-                <a:tint val="75000"/>
-                <a:satMod val="210000"/>
-              </a:schemeClr>
-            </a:gs>
-            <a:gs pos="100000">
-              <a:schemeClr val="accent1">
-                <a:hueOff val="0"/>
-                <a:satOff val="0"/>
-                <a:lumOff val="0"/>
-                <a:alphaOff val="0"/>
-                <a:tint val="85000"/>
-                <a:satMod val="210000"/>
-              </a:schemeClr>
-            </a:gs>
-          </a:gsLst>
-          <a:lin ang="5400000" scaled="1"/>
-        </a:gradFill>
-        <a:ln>
-          <a:noFill/>
-        </a:ln>
-        <a:effectLst>
-          <a:outerShdw blurRad="76200" dist="50800" dir="5400000" rotWithShape="0">
-            <a:srgbClr val="4E3B30">
-              <a:alpha val="60000"/>
-            </a:srgbClr>
-          </a:outerShdw>
-        </a:effectLst>
-        <a:scene3d>
-          <a:camera prst="orthographicFront"/>
-          <a:lightRig rig="flat" dir="t"/>
-        </a:scene3d>
-        <a:sp3d prstMaterial="dkEdge">
-          <a:bevelT w="8200" h="38100"/>
-        </a:sp3d>
-      </dsp:spPr>
-      <dsp:style>
-        <a:lnRef idx="0">
-          <a:scrgbClr r="0" g="0" b="0"/>
-        </a:lnRef>
-        <a:fillRef idx="2">
-          <a:scrgbClr r="0" g="0" b="0"/>
-        </a:fillRef>
-        <a:effectRef idx="1">
-          <a:scrgbClr r="0" g="0" b="0"/>
-        </a:effectRef>
-        <a:fontRef idx="minor">
-          <a:schemeClr val="dk1"/>
-        </a:fontRef>
-      </dsp:style>
-      <dsp:txBody>
-        <a:bodyPr spcFirstLastPara="0" vert="horz" wrap="square" lIns="13335" tIns="13335" rIns="13335" bIns="13335" numCol="1" spcCol="1270" anchor="ctr" anchorCtr="0">
-          <a:noAutofit/>
-        </a:bodyPr>
-        <a:lstStyle/>
-        <a:p>
-          <a:pPr lvl="0" algn="ctr" defTabSz="933450">
-            <a:lnSpc>
-              <a:spcPct val="90000"/>
-            </a:lnSpc>
-            <a:spcBef>
-              <a:spcPct val="0"/>
-            </a:spcBef>
-            <a:spcAft>
-              <a:spcPct val="35000"/>
-            </a:spcAft>
-          </a:pPr>
-          <a:r>
-            <a:rPr lang="en-US" sz="2100" kern="1200" dirty="0" smtClean="0"/>
-            <a:t>Refactoring</a:t>
-          </a:r>
-          <a:endParaRPr lang="en-US" sz="2100" kern="1200" dirty="0"/>
-        </a:p>
-      </dsp:txBody>
-      <dsp:txXfrm>
-        <a:off x="4807608" y="4483063"/>
-        <a:ext cx="1891796" cy="1891796"/>
-      </dsp:txXfrm>
-    </dsp:sp>
-    <dsp:sp modelId="{3E6E8334-949A-424B-AB66-FB3C0B5F1690}">
-      <dsp:nvSpPr>
-        <dsp:cNvPr id="0" name=""/>
-        <dsp:cNvSpPr/>
-      </dsp:nvSpPr>
-      <dsp:spPr>
-        <a:xfrm rot="7560000">
-          <a:off x="3350075" y="4520291"/>
-          <a:ext cx="305676" cy="39547"/>
-        </a:xfrm>
-        <a:custGeom>
-          <a:avLst/>
-          <a:gdLst/>
-          <a:ahLst/>
-          <a:cxnLst/>
-          <a:rect l="0" t="0" r="0" b="0"/>
-          <a:pathLst>
-            <a:path>
-              <a:moveTo>
-                <a:pt x="0" y="19773"/>
-              </a:moveTo>
-              <a:lnTo>
-                <a:pt x="305676" y="19773"/>
-              </a:lnTo>
-            </a:path>
-          </a:pathLst>
-        </a:custGeom>
-        <a:noFill/>
-        <a:ln w="25400" cap="flat" cmpd="sng" algn="ctr">
-          <a:solidFill>
-            <a:schemeClr val="accent1">
-              <a:shade val="60000"/>
-              <a:hueOff val="0"/>
-              <a:satOff val="0"/>
-              <a:lumOff val="0"/>
-              <a:alphaOff val="0"/>
-            </a:schemeClr>
-          </a:solidFill>
-          <a:prstDash val="solid"/>
-        </a:ln>
-        <a:effectLst/>
-      </dsp:spPr>
-      <dsp:style>
-        <a:lnRef idx="2">
-          <a:scrgbClr r="0" g="0" b="0"/>
-        </a:lnRef>
-        <a:fillRef idx="0">
-          <a:scrgbClr r="0" g="0" b="0"/>
-        </a:fillRef>
-        <a:effectRef idx="0">
-          <a:scrgbClr r="0" g="0" b="0"/>
-        </a:effectRef>
-        <a:fontRef idx="minor"/>
-      </dsp:style>
-      <dsp:txBody>
-        <a:bodyPr spcFirstLastPara="0" vert="horz" wrap="square" lIns="12700" tIns="0" rIns="12700" bIns="0" numCol="1" spcCol="1270" anchor="ctr" anchorCtr="0">
-          <a:noAutofit/>
-        </a:bodyPr>
-        <a:lstStyle/>
-        <a:p>
-          <a:pPr lvl="0" algn="ctr" defTabSz="222250">
-            <a:lnSpc>
-              <a:spcPct val="90000"/>
-            </a:lnSpc>
-            <a:spcBef>
-              <a:spcPct val="0"/>
-            </a:spcBef>
-            <a:spcAft>
-              <a:spcPct val="35000"/>
-            </a:spcAft>
-          </a:pPr>
-          <a:endParaRPr lang="en-US" sz="500" kern="1200"/>
-        </a:p>
-      </dsp:txBody>
-      <dsp:txXfrm rot="7560000">
-        <a:off x="3495271" y="4532423"/>
-        <a:ext cx="15283" cy="15283"/>
-      </dsp:txXfrm>
-    </dsp:sp>
-    <dsp:sp modelId="{3804797F-9A8B-495D-B6BC-8D14959040DB}">
-      <dsp:nvSpPr>
-        <dsp:cNvPr id="0" name=""/>
-        <dsp:cNvSpPr/>
-      </dsp:nvSpPr>
-      <dsp:spPr>
-        <a:xfrm>
-          <a:off x="1911194" y="4483063"/>
-          <a:ext cx="1891796" cy="1891796"/>
-        </a:xfrm>
-        <a:prstGeom prst="ellipse">
-          <a:avLst/>
-        </a:prstGeom>
-        <a:gradFill rotWithShape="0">
-          <a:gsLst>
-            <a:gs pos="0">
-              <a:schemeClr val="accent1">
-                <a:hueOff val="0"/>
-                <a:satOff val="0"/>
-                <a:lumOff val="0"/>
-                <a:alphaOff val="0"/>
-                <a:tint val="30000"/>
-                <a:satMod val="250000"/>
-              </a:schemeClr>
-            </a:gs>
-            <a:gs pos="72000">
-              <a:schemeClr val="accent1">
-                <a:hueOff val="0"/>
-                <a:satOff val="0"/>
-                <a:lumOff val="0"/>
-                <a:alphaOff val="0"/>
-                <a:tint val="75000"/>
-                <a:satMod val="210000"/>
-              </a:schemeClr>
-            </a:gs>
-            <a:gs pos="100000">
-              <a:schemeClr val="accent1">
-                <a:hueOff val="0"/>
-                <a:satOff val="0"/>
-                <a:lumOff val="0"/>
-                <a:alphaOff val="0"/>
-                <a:tint val="85000"/>
-                <a:satMod val="210000"/>
-              </a:schemeClr>
-            </a:gs>
-          </a:gsLst>
-          <a:lin ang="5400000" scaled="1"/>
-        </a:gradFill>
-        <a:ln>
-          <a:noFill/>
-        </a:ln>
-        <a:effectLst>
-          <a:outerShdw blurRad="76200" dist="50800" dir="5400000" rotWithShape="0">
-            <a:srgbClr val="4E3B30">
-              <a:alpha val="60000"/>
-            </a:srgbClr>
-          </a:outerShdw>
-        </a:effectLst>
-        <a:scene3d>
-          <a:camera prst="orthographicFront"/>
-          <a:lightRig rig="flat" dir="t"/>
-        </a:scene3d>
-        <a:sp3d prstMaterial="dkEdge">
-          <a:bevelT w="8200" h="38100"/>
-        </a:sp3d>
-      </dsp:spPr>
-      <dsp:style>
-        <a:lnRef idx="0">
-          <a:scrgbClr r="0" g="0" b="0"/>
-        </a:lnRef>
-        <a:fillRef idx="2">
-          <a:scrgbClr r="0" g="0" b="0"/>
-        </a:fillRef>
-        <a:effectRef idx="1">
-          <a:scrgbClr r="0" g="0" b="0"/>
-        </a:effectRef>
-        <a:fontRef idx="minor">
-          <a:schemeClr val="dk1"/>
-        </a:fontRef>
-      </dsp:style>
-      <dsp:txBody>
-        <a:bodyPr spcFirstLastPara="0" vert="horz" wrap="square" lIns="13335" tIns="13335" rIns="13335" bIns="13335" numCol="1" spcCol="1270" anchor="ctr" anchorCtr="0">
-          <a:noAutofit/>
-        </a:bodyPr>
-        <a:lstStyle/>
-        <a:p>
-          <a:pPr lvl="0" algn="ctr" defTabSz="933450">
-            <a:lnSpc>
-              <a:spcPct val="90000"/>
-            </a:lnSpc>
-            <a:spcBef>
-              <a:spcPct val="0"/>
-            </a:spcBef>
-            <a:spcAft>
-              <a:spcPct val="35000"/>
-            </a:spcAft>
-          </a:pPr>
-          <a:r>
-            <a:rPr lang="en-US" sz="2100" kern="1200" dirty="0" smtClean="0"/>
-            <a:t>Business Value Drives</a:t>
-          </a:r>
-          <a:endParaRPr lang="en-US" sz="2100" kern="1200" dirty="0"/>
-        </a:p>
-      </dsp:txBody>
-      <dsp:txXfrm>
-        <a:off x="1911194" y="4483063"/>
-        <a:ext cx="1891796" cy="1891796"/>
-      </dsp:txXfrm>
-    </dsp:sp>
-    <dsp:sp modelId="{21D9DE24-5E9E-41D5-ADC1-2A4A95EE842D}">
-      <dsp:nvSpPr>
-        <dsp:cNvPr id="0" name=""/>
-        <dsp:cNvSpPr/>
-      </dsp:nvSpPr>
-      <dsp:spPr>
-        <a:xfrm rot="11880000">
-          <a:off x="2853621" y="2997549"/>
-          <a:ext cx="328241" cy="39547"/>
-        </a:xfrm>
-        <a:custGeom>
-          <a:avLst/>
-          <a:gdLst/>
-          <a:ahLst/>
-          <a:cxnLst/>
-          <a:rect l="0" t="0" r="0" b="0"/>
-          <a:pathLst>
-            <a:path>
-              <a:moveTo>
-                <a:pt x="0" y="19773"/>
-              </a:moveTo>
-              <a:lnTo>
-                <a:pt x="328241" y="19773"/>
-              </a:lnTo>
-            </a:path>
-          </a:pathLst>
-        </a:custGeom>
-        <a:noFill/>
-        <a:ln w="25400" cap="flat" cmpd="sng" algn="ctr">
-          <a:solidFill>
-            <a:schemeClr val="accent1">
-              <a:shade val="60000"/>
-              <a:hueOff val="0"/>
-              <a:satOff val="0"/>
-              <a:lumOff val="0"/>
-              <a:alphaOff val="0"/>
-            </a:schemeClr>
-          </a:solidFill>
-          <a:prstDash val="solid"/>
-        </a:ln>
-        <a:effectLst/>
-      </dsp:spPr>
-      <dsp:style>
-        <a:lnRef idx="2">
-          <a:scrgbClr r="0" g="0" b="0"/>
-        </a:lnRef>
-        <a:fillRef idx="0">
-          <a:scrgbClr r="0" g="0" b="0"/>
-        </a:fillRef>
-        <a:effectRef idx="0">
-          <a:scrgbClr r="0" g="0" b="0"/>
-        </a:effectRef>
-        <a:fontRef idx="minor"/>
-      </dsp:style>
-      <dsp:txBody>
-        <a:bodyPr spcFirstLastPara="0" vert="horz" wrap="square" lIns="12700" tIns="0" rIns="12700" bIns="0" numCol="1" spcCol="1270" anchor="ctr" anchorCtr="0">
-          <a:noAutofit/>
-        </a:bodyPr>
-        <a:lstStyle/>
-        <a:p>
-          <a:pPr lvl="0" algn="ctr" defTabSz="222250">
-            <a:lnSpc>
-              <a:spcPct val="90000"/>
-            </a:lnSpc>
-            <a:spcBef>
-              <a:spcPct val="0"/>
-            </a:spcBef>
-            <a:spcAft>
-              <a:spcPct val="35000"/>
-            </a:spcAft>
-          </a:pPr>
-          <a:endParaRPr lang="en-US" sz="500" kern="1200"/>
-        </a:p>
-      </dsp:txBody>
-      <dsp:txXfrm rot="11880000">
-        <a:off x="3009536" y="3009116"/>
-        <a:ext cx="16412" cy="16412"/>
-      </dsp:txXfrm>
-    </dsp:sp>
-    <dsp:sp modelId="{C16832CE-8769-4C72-B96D-32484FDFBFD1}">
-      <dsp:nvSpPr>
-        <dsp:cNvPr id="0" name=""/>
-        <dsp:cNvSpPr/>
-      </dsp:nvSpPr>
-      <dsp:spPr>
-        <a:xfrm>
-          <a:off x="1016152" y="1728409"/>
-          <a:ext cx="1891796" cy="1891796"/>
-        </a:xfrm>
-        <a:prstGeom prst="ellipse">
-          <a:avLst/>
-        </a:prstGeom>
-        <a:gradFill rotWithShape="0">
-          <a:gsLst>
-            <a:gs pos="0">
-              <a:schemeClr val="accent1">
-                <a:hueOff val="0"/>
-                <a:satOff val="0"/>
-                <a:lumOff val="0"/>
-                <a:alphaOff val="0"/>
-                <a:tint val="30000"/>
-                <a:satMod val="250000"/>
-              </a:schemeClr>
-            </a:gs>
-            <a:gs pos="72000">
-              <a:schemeClr val="accent1">
-                <a:hueOff val="0"/>
-                <a:satOff val="0"/>
-                <a:lumOff val="0"/>
-                <a:alphaOff val="0"/>
-                <a:tint val="75000"/>
-                <a:satMod val="210000"/>
-              </a:schemeClr>
-            </a:gs>
-            <a:gs pos="100000">
-              <a:schemeClr val="accent1">
-                <a:hueOff val="0"/>
-                <a:satOff val="0"/>
-                <a:lumOff val="0"/>
-                <a:alphaOff val="0"/>
-                <a:tint val="85000"/>
-                <a:satMod val="210000"/>
-              </a:schemeClr>
-            </a:gs>
-          </a:gsLst>
-          <a:lin ang="5400000" scaled="1"/>
-        </a:gradFill>
-        <a:ln>
-          <a:noFill/>
-        </a:ln>
-        <a:effectLst>
-          <a:outerShdw blurRad="76200" dist="50800" dir="5400000" rotWithShape="0">
-            <a:srgbClr val="4E3B30">
-              <a:alpha val="60000"/>
-            </a:srgbClr>
-          </a:outerShdw>
-        </a:effectLst>
-        <a:scene3d>
-          <a:camera prst="orthographicFront"/>
-          <a:lightRig rig="flat" dir="t"/>
-        </a:scene3d>
-        <a:sp3d prstMaterial="dkEdge">
-          <a:bevelT w="8200" h="38100"/>
-        </a:sp3d>
-      </dsp:spPr>
-      <dsp:style>
-        <a:lnRef idx="0">
-          <a:scrgbClr r="0" g="0" b="0"/>
-        </a:lnRef>
-        <a:fillRef idx="2">
-          <a:scrgbClr r="0" g="0" b="0"/>
-        </a:fillRef>
-        <a:effectRef idx="1">
-          <a:scrgbClr r="0" g="0" b="0"/>
-        </a:effectRef>
-        <a:fontRef idx="minor">
-          <a:schemeClr val="dk1"/>
-        </a:fontRef>
-      </dsp:style>
-      <dsp:txBody>
-        <a:bodyPr spcFirstLastPara="0" vert="horz" wrap="square" lIns="13335" tIns="13335" rIns="13335" bIns="13335" numCol="1" spcCol="1270" anchor="ctr" anchorCtr="0">
-          <a:noAutofit/>
-        </a:bodyPr>
-        <a:lstStyle/>
-        <a:p>
-          <a:pPr lvl="0" algn="ctr" defTabSz="933450">
-            <a:lnSpc>
-              <a:spcPct val="90000"/>
-            </a:lnSpc>
-            <a:spcBef>
-              <a:spcPct val="0"/>
-            </a:spcBef>
-            <a:spcAft>
-              <a:spcPct val="35000"/>
-            </a:spcAft>
-          </a:pPr>
-          <a:r>
-            <a:rPr lang="en-US" sz="2100" kern="1200" dirty="0" smtClean="0"/>
-            <a:t>Domain Model</a:t>
-          </a:r>
-          <a:endParaRPr lang="en-US" sz="2100" kern="1200" dirty="0"/>
-        </a:p>
-      </dsp:txBody>
-      <dsp:txXfrm>
-        <a:off x="1016152" y="1728409"/>
-        <a:ext cx="1891796" cy="1891796"/>
-      </dsp:txXfrm>
-    </dsp:sp>
-  </dsp:spTree>
-</dsp:drawing>
 </file>
 
 <file path=ppt/diagrams/layout1.xml><?xml version="1.0" encoding="utf-8"?>
@@ -3829,7 +2751,7 @@
             <a:fld id="{7EF14571-6E45-479D-8EAF-A36FF0C632A1}" type="datetimeFigureOut">
               <a:rPr lang="en-US" smtClean="0"/>
               <a:pPr/>
-              <a:t>10/21/2010</a:t>
+              <a:t>10/22/2010</a:t>
             </a:fld>
             <a:endParaRPr lang="en-US"/>
           </a:p>
@@ -4363,7 +3285,7 @@
             <a:fld id="{03A9975F-C47A-452A-85E0-869F4D5D71B0}" type="datetimeFigureOut">
               <a:rPr lang="en-US" smtClean="0"/>
               <a:pPr/>
-              <a:t>10/21/2010</a:t>
+              <a:t>10/22/2010</a:t>
             </a:fld>
             <a:endParaRPr lang="en-US"/>
           </a:p>
@@ -4536,7 +3458,7 @@
             <a:fld id="{03A9975F-C47A-452A-85E0-869F4D5D71B0}" type="datetimeFigureOut">
               <a:rPr lang="en-US" smtClean="0"/>
               <a:pPr/>
-              <a:t>10/21/2010</a:t>
+              <a:t>10/22/2010</a:t>
             </a:fld>
             <a:endParaRPr lang="en-US"/>
           </a:p>
@@ -4714,7 +3636,7 @@
             <a:fld id="{03A9975F-C47A-452A-85E0-869F4D5D71B0}" type="datetimeFigureOut">
               <a:rPr lang="en-US" smtClean="0"/>
               <a:pPr/>
-              <a:t>10/21/2010</a:t>
+              <a:t>10/22/2010</a:t>
             </a:fld>
             <a:endParaRPr lang="en-US"/>
           </a:p>
@@ -4882,7 +3804,7 @@
             <a:fld id="{03A9975F-C47A-452A-85E0-869F4D5D71B0}" type="datetimeFigureOut">
               <a:rPr lang="en-US" smtClean="0"/>
               <a:pPr/>
-              <a:t>10/21/2010</a:t>
+              <a:t>10/22/2010</a:t>
             </a:fld>
             <a:endParaRPr lang="en-US"/>
           </a:p>
@@ -5119,7 +4041,7 @@
             <a:fld id="{03A9975F-C47A-452A-85E0-869F4D5D71B0}" type="datetimeFigureOut">
               <a:rPr lang="en-US" smtClean="0"/>
               <a:pPr/>
-              <a:t>10/21/2010</a:t>
+              <a:t>10/22/2010</a:t>
             </a:fld>
             <a:endParaRPr lang="en-US"/>
           </a:p>
@@ -5418,7 +4340,7 @@
             <a:fld id="{03A9975F-C47A-452A-85E0-869F4D5D71B0}" type="datetimeFigureOut">
               <a:rPr lang="en-US" smtClean="0"/>
               <a:pPr/>
-              <a:t>10/21/2010</a:t>
+              <a:t>10/22/2010</a:t>
             </a:fld>
             <a:endParaRPr lang="en-US"/>
           </a:p>
@@ -5805,7 +4727,7 @@
             <a:fld id="{03A9975F-C47A-452A-85E0-869F4D5D71B0}" type="datetimeFigureOut">
               <a:rPr lang="en-US" smtClean="0"/>
               <a:pPr/>
-              <a:t>10/21/2010</a:t>
+              <a:t>10/22/2010</a:t>
             </a:fld>
             <a:endParaRPr lang="en-US"/>
           </a:p>
@@ -5981,7 +4903,7 @@
             <a:fld id="{03A9975F-C47A-452A-85E0-869F4D5D71B0}" type="datetimeFigureOut">
               <a:rPr lang="en-US" smtClean="0"/>
               <a:pPr/>
-              <a:t>10/21/2010</a:t>
+              <a:t>10/22/2010</a:t>
             </a:fld>
             <a:endParaRPr lang="en-US"/>
           </a:p>
@@ -6074,7 +4996,7 @@
             <a:fld id="{03A9975F-C47A-452A-85E0-869F4D5D71B0}" type="datetimeFigureOut">
               <a:rPr lang="en-US" smtClean="0"/>
               <a:pPr/>
-              <a:t>10/21/2010</a:t>
+              <a:t>10/22/2010</a:t>
             </a:fld>
             <a:endParaRPr lang="en-US"/>
           </a:p>
@@ -6372,7 +5294,7 @@
             <a:fld id="{03A9975F-C47A-452A-85E0-869F4D5D71B0}" type="datetimeFigureOut">
               <a:rPr lang="en-US" smtClean="0"/>
               <a:pPr/>
-              <a:t>10/21/2010</a:t>
+              <a:t>10/22/2010</a:t>
             </a:fld>
             <a:endParaRPr lang="en-US"/>
           </a:p>
@@ -6509,7 +5431,7 @@
             <a:fld id="{03A9975F-C47A-452A-85E0-869F4D5D71B0}" type="datetimeFigureOut">
               <a:rPr lang="en-US" smtClean="0"/>
               <a:pPr/>
-              <a:t>10/21/2010</a:t>
+              <a:t>10/22/2010</a:t>
             </a:fld>
             <a:endParaRPr lang="en-US"/>
           </a:p>
@@ -6815,7 +5737,7 @@
             <a:fld id="{03A9975F-C47A-452A-85E0-869F4D5D71B0}" type="datetimeFigureOut">
               <a:rPr lang="en-US" smtClean="0"/>
               <a:pPr/>
-              <a:t>10/21/2010</a:t>
+              <a:t>10/22/2010</a:t>
             </a:fld>
             <a:endParaRPr lang="en-US"/>
           </a:p>
@@ -8147,24 +7069,7 @@
                 <a:ea typeface="+mn-ea"/>
                 <a:cs typeface="+mn-cs"/>
               </a:rPr>
-              <a:t>I </a:t>
-            </a:r>
-            <a:r>
-              <a:rPr kumimoji="0" lang="en-US" sz="2800" b="0" i="0" u="none" strike="noStrike" kern="1200" cap="none" spc="0" normalizeH="0" baseline="0" noProof="0" dirty="0" smtClean="0">
-                <a:ln>
-                  <a:noFill/>
-                </a:ln>
-                <a:solidFill>
-                  <a:schemeClr val="tx2"/>
-                </a:solidFill>
-                <a:effectLst/>
-                <a:uLnTx/>
-                <a:uFillTx/>
-                <a:latin typeface="+mn-lt"/>
-                <a:ea typeface="+mn-ea"/>
-                <a:cs typeface="+mn-cs"/>
-              </a:rPr>
-              <a:t>want to </a:t>
+              <a:t>I want to </a:t>
             </a:r>
             <a:r>
               <a:rPr kumimoji="0" lang="en-US" sz="2800" b="0" i="0" u="none" strike="noStrike" kern="1200" cap="none" spc="0" normalizeH="0" baseline="0" noProof="0" dirty="0" smtClean="0">
@@ -8376,13 +7281,6 @@
               </a:rPr>
               <a:t>I expect for a track to be added to the site</a:t>
             </a:r>
-            <a:endParaRPr lang="en-US" sz="2400" dirty="0" smtClean="0">
-              <a:solidFill>
-                <a:schemeClr val="bg2">
-                  <a:lumMod val="50000"/>
-                </a:schemeClr>
-              </a:solidFill>
-            </a:endParaRPr>
           </a:p>
         </p:txBody>
       </p:sp>
@@ -8410,11 +7308,7 @@
           <a:p>
             <a:r>
               <a:rPr lang="en-US" sz="2400" dirty="0" smtClean="0"/>
-              <a:t>Scenario : </a:t>
-            </a:r>
-            <a:r>
-              <a:rPr lang="en-US" sz="2400" dirty="0" smtClean="0"/>
-              <a:t>Adding a Track</a:t>
+              <a:t>Scenario : Adding a Track</a:t>
             </a:r>
             <a:endParaRPr lang="en-US" sz="2400" dirty="0"/>
           </a:p>
@@ -8504,13 +7398,6 @@
               </a:rPr>
               <a:t>I expect to see a message stating that track already exists</a:t>
             </a:r>
-            <a:endParaRPr lang="en-US" sz="2400" dirty="0" smtClean="0">
-              <a:solidFill>
-                <a:schemeClr val="bg2">
-                  <a:lumMod val="50000"/>
-                </a:schemeClr>
-              </a:solidFill>
-            </a:endParaRPr>
           </a:p>
         </p:txBody>
       </p:sp>
@@ -8641,24 +7528,7 @@
                 <a:ea typeface="+mn-ea"/>
                 <a:cs typeface="+mn-cs"/>
               </a:rPr>
-              <a:t>I </a:t>
-            </a:r>
-            <a:r>
-              <a:rPr kumimoji="0" lang="en-US" sz="2800" b="0" i="0" u="none" strike="noStrike" kern="1200" cap="none" spc="0" normalizeH="0" baseline="0" noProof="0" dirty="0" smtClean="0">
-                <a:ln>
-                  <a:noFill/>
-                </a:ln>
-                <a:solidFill>
-                  <a:schemeClr val="tx2"/>
-                </a:solidFill>
-                <a:effectLst/>
-                <a:uLnTx/>
-                <a:uFillTx/>
-                <a:latin typeface="+mn-lt"/>
-                <a:ea typeface="+mn-ea"/>
-                <a:cs typeface="+mn-cs"/>
-              </a:rPr>
-              <a:t>want to </a:t>
+              <a:t>I want to </a:t>
             </a:r>
             <a:r>
               <a:rPr kumimoji="0" lang="en-US" sz="2800" b="0" i="0" u="none" strike="noStrike" kern="1200" cap="none" spc="0" normalizeH="0" baseline="0" noProof="0" dirty="0" smtClean="0">
@@ -8712,24 +7582,7 @@
                 <a:ea typeface="+mn-ea"/>
                 <a:cs typeface="+mn-cs"/>
               </a:rPr>
-              <a:t>So </a:t>
-            </a:r>
-            <a:r>
-              <a:rPr kumimoji="0" lang="en-US" sz="2800" b="0" i="0" u="none" strike="noStrike" kern="1200" cap="none" spc="0" normalizeH="0" baseline="0" noProof="0" dirty="0" smtClean="0">
-                <a:ln>
-                  <a:noFill/>
-                </a:ln>
-                <a:solidFill>
-                  <a:schemeClr val="tx2"/>
-                </a:solidFill>
-                <a:effectLst/>
-                <a:uLnTx/>
-                <a:uFillTx/>
-                <a:latin typeface="+mn-lt"/>
-                <a:ea typeface="+mn-ea"/>
-                <a:cs typeface="+mn-cs"/>
-              </a:rPr>
-              <a:t>that </a:t>
+              <a:t>So that </a:t>
             </a:r>
             <a:r>
               <a:rPr kumimoji="0" lang="en-US" sz="2800" b="0" i="0" u="none" strike="noStrike" kern="1200" cap="none" spc="0" normalizeH="0" baseline="0" noProof="0" dirty="0" smtClean="0">
@@ -8750,22 +7603,6 @@
               </a:rPr>
               <a:t>I can teach people new things</a:t>
             </a:r>
-            <a:endParaRPr kumimoji="0" lang="en-US" sz="2800" b="0" i="0" u="none" strike="noStrike" kern="1200" cap="none" spc="0" normalizeH="0" baseline="0" noProof="0" dirty="0" smtClean="0">
-              <a:ln>
-                <a:noFill/>
-              </a:ln>
-              <a:solidFill>
-                <a:schemeClr val="bg2">
-                  <a:lumMod val="50000"/>
-                </a:schemeClr>
-              </a:solidFill>
-              <a:effectLst/>
-              <a:uLnTx/>
-              <a:uFillTx/>
-              <a:latin typeface="+mn-lt"/>
-              <a:ea typeface="+mn-ea"/>
-              <a:cs typeface="+mn-cs"/>
-            </a:endParaRPr>
           </a:p>
         </p:txBody>
       </p:sp>
@@ -8777,8 +7614,8 @@
         </p:nvSpPr>
         <p:spPr>
           <a:xfrm>
-            <a:off x="533400" y="2743200"/>
-            <a:ext cx="6294031" cy="1569660"/>
+            <a:off x="609600" y="2362200"/>
+            <a:ext cx="5864298" cy="2031325"/>
           </a:xfrm>
           <a:prstGeom prst="rect">
             <a:avLst/>
@@ -8792,43 +7629,100 @@
           <a:lstStyle/>
           <a:p>
             <a:r>
-              <a:rPr lang="en-US" sz="2400" dirty="0" smtClean="0"/>
+              <a:rPr lang="en-US" dirty="0" smtClean="0"/>
               <a:t>Given </a:t>
             </a:r>
             <a:r>
-              <a:rPr lang="en-US" sz="2400" dirty="0" smtClean="0">
+              <a:rPr lang="en-US" dirty="0" smtClean="0">
                 <a:solidFill>
                   <a:schemeClr val="bg2">
                     <a:lumMod val="50000"/>
                   </a:schemeClr>
                 </a:solidFill>
               </a:rPr>
-              <a:t>the track has not been added</a:t>
-            </a:r>
-          </a:p>
-          <a:p>
-            <a:r>
-              <a:rPr lang="en-US" sz="2400" dirty="0" smtClean="0"/>
+              <a:t>I am logged into the site</a:t>
+            </a:r>
+            <a:endParaRPr lang="en-US" dirty="0" smtClean="0">
+              <a:solidFill>
+                <a:schemeClr val="bg2">
+                  <a:lumMod val="50000"/>
+                </a:schemeClr>
+              </a:solidFill>
+            </a:endParaRPr>
+          </a:p>
+          <a:p>
+            <a:r>
+              <a:rPr lang="en-US" dirty="0" smtClean="0"/>
               <a:t>When </a:t>
             </a:r>
             <a:r>
-              <a:rPr lang="en-US" sz="2400" dirty="0" smtClean="0">
+              <a:rPr lang="en-US" dirty="0" smtClean="0">
                 <a:solidFill>
                   <a:schemeClr val="bg2">
                     <a:lumMod val="50000"/>
                   </a:schemeClr>
                 </a:solidFill>
               </a:rPr>
-              <a:t>I type in a track name</a:t>
-            </a:r>
-          </a:p>
-          <a:p>
-            <a:r>
-              <a:rPr lang="en-US" sz="2400" dirty="0" smtClean="0"/>
+              <a:t>I click the Submit Presentation link</a:t>
+            </a:r>
+            <a:endParaRPr lang="en-US" dirty="0" smtClean="0">
+              <a:solidFill>
+                <a:schemeClr val="bg2">
+                  <a:lumMod val="50000"/>
+                </a:schemeClr>
+              </a:solidFill>
+            </a:endParaRPr>
+          </a:p>
+          <a:p>
+            <a:r>
+              <a:rPr lang="en-US" dirty="0" smtClean="0"/>
               <a:t>And </a:t>
             </a:r>
             <a:r>
-              <a:rPr lang="en-US" sz="2400" dirty="0" smtClean="0">
+              <a:rPr lang="en-US" dirty="0" smtClean="0">
+                <a:solidFill>
+                  <a:schemeClr val="bg2">
+                    <a:lumMod val="50000"/>
+                  </a:schemeClr>
+                </a:solidFill>
+              </a:rPr>
+              <a:t>I </a:t>
+            </a:r>
+            <a:r>
+              <a:rPr lang="en-US" dirty="0" smtClean="0">
+                <a:solidFill>
+                  <a:schemeClr val="bg2">
+                    <a:lumMod val="50000"/>
+                  </a:schemeClr>
+                </a:solidFill>
+              </a:rPr>
+              <a:t>enter “Software Dev Evolution” in the title field</a:t>
+            </a:r>
+          </a:p>
+          <a:p>
+            <a:r>
+              <a:rPr lang="en-US" dirty="0" smtClean="0"/>
+              <a:t>And </a:t>
+            </a:r>
+            <a:r>
+              <a:rPr lang="en-US" dirty="0" smtClean="0">
+                <a:solidFill>
+                  <a:schemeClr val="bg2">
+                    <a:lumMod val="50000"/>
+                  </a:schemeClr>
+                </a:solidFill>
+              </a:rPr>
+              <a:t>I enter “some info” in the description field</a:t>
+            </a:r>
+            <a:endParaRPr lang="en-US" dirty="0" smtClean="0"/>
+          </a:p>
+          <a:p>
+            <a:r>
+              <a:rPr lang="en-US" dirty="0" smtClean="0"/>
+              <a:t>And </a:t>
+            </a:r>
+            <a:r>
+              <a:rPr lang="en-US" dirty="0" smtClean="0">
                 <a:solidFill>
                   <a:schemeClr val="bg2">
                     <a:lumMod val="50000"/>
@@ -8840,20 +7734,42 @@
           </a:p>
           <a:p>
             <a:r>
-              <a:rPr lang="en-US" sz="2400" dirty="0" smtClean="0"/>
+              <a:rPr lang="en-US" dirty="0" smtClean="0"/>
               <a:t>Then </a:t>
             </a:r>
             <a:r>
-              <a:rPr lang="en-US" sz="2400" dirty="0" smtClean="0">
+              <a:rPr lang="en-US" dirty="0" smtClean="0">
                 <a:solidFill>
                   <a:schemeClr val="bg2">
                     <a:lumMod val="50000"/>
                   </a:schemeClr>
                 </a:solidFill>
               </a:rPr>
-              <a:t>I expect for a track to be added to the site</a:t>
-            </a:r>
-            <a:endParaRPr lang="en-US" sz="2400" dirty="0" smtClean="0">
+              <a:t>I expect </a:t>
+            </a:r>
+            <a:r>
+              <a:rPr lang="en-US" dirty="0" smtClean="0">
+                <a:solidFill>
+                  <a:schemeClr val="bg2">
+                    <a:lumMod val="50000"/>
+                  </a:schemeClr>
+                </a:solidFill>
+              </a:rPr>
+              <a:t>to see that presentation under my submitted</a:t>
+            </a:r>
+          </a:p>
+          <a:p>
+            <a:r>
+              <a:rPr lang="en-US" dirty="0" smtClean="0">
+                <a:solidFill>
+                  <a:schemeClr val="bg2">
+                    <a:lumMod val="50000"/>
+                  </a:schemeClr>
+                </a:solidFill>
+              </a:rPr>
+              <a:t>presentations</a:t>
+            </a:r>
+            <a:endParaRPr lang="en-US" dirty="0" smtClean="0">
               <a:solidFill>
                 <a:schemeClr val="bg2">
                   <a:lumMod val="50000"/>
@@ -8887,11 +7803,7 @@
           <a:p>
             <a:r>
               <a:rPr lang="en-US" sz="2400" dirty="0" smtClean="0"/>
-              <a:t>Scenario : </a:t>
-            </a:r>
-            <a:r>
-              <a:rPr lang="en-US" sz="2400" dirty="0" smtClean="0"/>
-              <a:t>Submitting a Session</a:t>
+              <a:t>Scenario : Submitting a Session</a:t>
             </a:r>
             <a:endParaRPr lang="en-US" sz="2400" dirty="0"/>
           </a:p>
@@ -8905,8 +7817,8 @@
         </p:nvSpPr>
         <p:spPr>
           <a:xfrm>
-            <a:off x="524129" y="4602540"/>
-            <a:ext cx="8391271" cy="1569660"/>
+            <a:off x="597401" y="4743271"/>
+            <a:ext cx="7101046" cy="1200329"/>
           </a:xfrm>
           <a:prstGeom prst="rect">
             <a:avLst/>
@@ -8920,68 +7832,95 @@
           <a:lstStyle/>
           <a:p>
             <a:r>
-              <a:rPr lang="en-US" sz="2400" dirty="0" smtClean="0"/>
+              <a:rPr lang="en-US" dirty="0" smtClean="0"/>
               <a:t>Given </a:t>
             </a:r>
             <a:r>
-              <a:rPr lang="en-US" sz="2400" dirty="0" smtClean="0">
+              <a:rPr lang="en-US" dirty="0" smtClean="0">
                 <a:solidFill>
                   <a:schemeClr val="bg2">
                     <a:lumMod val="50000"/>
                   </a:schemeClr>
                 </a:solidFill>
               </a:rPr>
-              <a:t>the track has already added</a:t>
-            </a:r>
-          </a:p>
-          <a:p>
-            <a:r>
-              <a:rPr lang="en-US" sz="2400" dirty="0" smtClean="0"/>
-              <a:t>When </a:t>
-            </a:r>
-            <a:r>
-              <a:rPr lang="en-US" sz="2400" dirty="0" smtClean="0">
+              <a:t>I have submitted a presentation named “Software Dev </a:t>
+            </a:r>
+            <a:r>
+              <a:rPr lang="en-US" dirty="0" smtClean="0">
                 <a:solidFill>
                   <a:schemeClr val="bg2">
                     <a:lumMod val="50000"/>
                   </a:schemeClr>
                 </a:solidFill>
               </a:rPr>
-              <a:t>I type in a track name</a:t>
-            </a:r>
-          </a:p>
-          <a:p>
-            <a:r>
-              <a:rPr lang="en-US" sz="2400" dirty="0" smtClean="0"/>
-              <a:t>And </a:t>
-            </a:r>
-            <a:r>
-              <a:rPr lang="en-US" sz="2400" dirty="0" smtClean="0">
+              <a:t>Evolution”</a:t>
+            </a:r>
+          </a:p>
+          <a:p>
+            <a:r>
+              <a:rPr lang="en-US" dirty="0" smtClean="0"/>
+              <a:t>And</a:t>
+            </a:r>
+            <a:r>
+              <a:rPr lang="en-US" dirty="0" smtClean="0">
                 <a:solidFill>
                   <a:schemeClr val="bg2">
                     <a:lumMod val="50000"/>
                   </a:schemeClr>
                 </a:solidFill>
               </a:rPr>
-              <a:t>I click the Create button</a:t>
-            </a:r>
-          </a:p>
-          <a:p>
-            <a:r>
-              <a:rPr lang="en-US" sz="2400" dirty="0" smtClean="0"/>
-              <a:t>Then </a:t>
-            </a:r>
-            <a:r>
-              <a:rPr lang="en-US" sz="2400" dirty="0" smtClean="0">
+              <a:t> I am logged into the site</a:t>
+            </a:r>
+            <a:endParaRPr lang="en-US" dirty="0" smtClean="0">
+              <a:solidFill>
+                <a:schemeClr val="bg2">
+                  <a:lumMod val="50000"/>
+                </a:schemeClr>
+              </a:solidFill>
+            </a:endParaRPr>
+          </a:p>
+          <a:p>
+            <a:r>
+              <a:rPr lang="en-US" dirty="0" smtClean="0"/>
+              <a:t>When </a:t>
+            </a:r>
+            <a:r>
+              <a:rPr lang="en-US" dirty="0" smtClean="0">
                 <a:solidFill>
                   <a:schemeClr val="bg2">
                     <a:lumMod val="50000"/>
                   </a:schemeClr>
                 </a:solidFill>
               </a:rPr>
-              <a:t>I expect to see a message stating that track already exists</a:t>
-            </a:r>
-            <a:endParaRPr lang="en-US" sz="2400" dirty="0" smtClean="0">
+              <a:t>I click the submitted presentations link</a:t>
+            </a:r>
+          </a:p>
+          <a:p>
+            <a:r>
+              <a:rPr lang="en-US" dirty="0" smtClean="0"/>
+              <a:t>Then </a:t>
+            </a:r>
+            <a:r>
+              <a:rPr lang="en-US" dirty="0" smtClean="0">
+                <a:solidFill>
+                  <a:schemeClr val="bg2">
+                    <a:lumMod val="50000"/>
+                  </a:schemeClr>
+                </a:solidFill>
+              </a:rPr>
+              <a:t>I expect to see </a:t>
+            </a:r>
+            <a:r>
+              <a:rPr lang="en-US" dirty="0" smtClean="0">
+                <a:solidFill>
+                  <a:schemeClr val="bg2">
+                    <a:lumMod val="50000"/>
+                  </a:schemeClr>
+                </a:solidFill>
+              </a:rPr>
+              <a:t>the presentation in the list</a:t>
+            </a:r>
+            <a:endParaRPr lang="en-US" dirty="0" smtClean="0">
               <a:solidFill>
                 <a:schemeClr val="bg2">
                   <a:lumMod val="50000"/>
@@ -9082,8 +8021,27 @@
                 <a:ea typeface="+mn-ea"/>
                 <a:cs typeface="+mn-cs"/>
               </a:rPr>
-              <a:t>As </a:t>
-            </a:r>
+              <a:t>As an </a:t>
+            </a:r>
+            <a:r>
+              <a:rPr lang="en-US" sz="2800" dirty="0" smtClean="0">
+                <a:solidFill>
+                  <a:schemeClr val="bg2">
+                    <a:lumMod val="50000"/>
+                  </a:schemeClr>
+                </a:solidFill>
+              </a:rPr>
+              <a:t>Attendee</a:t>
+            </a:r>
+            <a:br>
+              <a:rPr lang="en-US" sz="2800" dirty="0" smtClean="0">
+                <a:solidFill>
+                  <a:schemeClr val="bg2">
+                    <a:lumMod val="50000"/>
+                  </a:schemeClr>
+                </a:solidFill>
+              </a:rPr>
+            </a:br>
             <a:r>
               <a:rPr kumimoji="0" lang="en-US" sz="2800" b="0" i="0" u="none" strike="noStrike" kern="1200" cap="none" spc="0" normalizeH="0" baseline="0" noProof="0" dirty="0" smtClean="0">
                 <a:ln>
@@ -9099,60 +8057,7 @@
                 <a:ea typeface="+mn-ea"/>
                 <a:cs typeface="+mn-cs"/>
               </a:rPr>
-              <a:t>an </a:t>
-            </a:r>
-            <a:r>
-              <a:rPr lang="en-US" sz="2800" dirty="0" smtClean="0">
-                <a:solidFill>
-                  <a:schemeClr val="bg2">
-                    <a:lumMod val="50000"/>
-                  </a:schemeClr>
-                </a:solidFill>
-              </a:rPr>
-              <a:t>Attendee</a:t>
-            </a:r>
-            <a:br>
-              <a:rPr lang="en-US" sz="2800" dirty="0" smtClean="0">
-                <a:solidFill>
-                  <a:schemeClr val="bg2">
-                    <a:lumMod val="50000"/>
-                  </a:schemeClr>
-                </a:solidFill>
-              </a:rPr>
-            </a:br>
-            <a:r>
-              <a:rPr kumimoji="0" lang="en-US" sz="2800" b="0" i="0" u="none" strike="noStrike" kern="1200" cap="none" spc="0" normalizeH="0" baseline="0" noProof="0" dirty="0" smtClean="0">
-                <a:ln>
-                  <a:noFill/>
-                </a:ln>
-                <a:solidFill>
-                  <a:schemeClr val="tx2"/>
-                </a:solidFill>
-                <a:effectLst/>
-                <a:uLnTx/>
-                <a:uFillTx/>
-                <a:latin typeface="+mn-lt"/>
-                <a:ea typeface="+mn-ea"/>
-                <a:cs typeface="+mn-cs"/>
-              </a:rPr>
-              <a:t>I </a:t>
-            </a:r>
-            <a:r>
-              <a:rPr kumimoji="0" lang="en-US" sz="2800" b="0" i="0" u="none" strike="noStrike" kern="1200" cap="none" spc="0" normalizeH="0" baseline="0" noProof="0" dirty="0" smtClean="0">
-                <a:ln>
-                  <a:noFill/>
-                </a:ln>
-                <a:solidFill>
-                  <a:schemeClr val="tx2"/>
-                </a:solidFill>
-                <a:effectLst/>
-                <a:uLnTx/>
-                <a:uFillTx/>
-                <a:latin typeface="+mn-lt"/>
-                <a:ea typeface="+mn-ea"/>
-                <a:cs typeface="+mn-cs"/>
-              </a:rPr>
-              <a:t>want to </a:t>
+              <a:t>I want to </a:t>
             </a:r>
             <a:r>
               <a:rPr kumimoji="0" lang="en-US" sz="2800" b="0" i="0" u="none" strike="noStrike" kern="1200" cap="none" spc="0" normalizeH="0" baseline="0" noProof="0" dirty="0" smtClean="0">
@@ -9244,24 +8149,7 @@
                 <a:ea typeface="+mn-ea"/>
                 <a:cs typeface="+mn-cs"/>
               </a:rPr>
-              <a:t>So </a:t>
-            </a:r>
-            <a:r>
-              <a:rPr kumimoji="0" lang="en-US" sz="2800" b="0" i="0" u="none" strike="noStrike" kern="1200" cap="none" spc="0" normalizeH="0" baseline="0" noProof="0" dirty="0" smtClean="0">
-                <a:ln>
-                  <a:noFill/>
-                </a:ln>
-                <a:solidFill>
-                  <a:schemeClr val="tx2"/>
-                </a:solidFill>
-                <a:effectLst/>
-                <a:uLnTx/>
-                <a:uFillTx/>
-                <a:latin typeface="+mn-lt"/>
-                <a:ea typeface="+mn-ea"/>
-                <a:cs typeface="+mn-cs"/>
-              </a:rPr>
-              <a:t>that </a:t>
+              <a:t>So that </a:t>
             </a:r>
             <a:r>
               <a:rPr kumimoji="0" lang="en-US" sz="2800" b="0" i="0" u="none" strike="noStrike" kern="1200" cap="none" spc="0" normalizeH="0" baseline="0" noProof="0" dirty="0" smtClean="0">
@@ -9329,7 +8217,7 @@
         <p:spPr>
           <a:xfrm>
             <a:off x="533400" y="2743200"/>
-            <a:ext cx="6294031" cy="1569660"/>
+            <a:ext cx="3813865" cy="1200329"/>
           </a:xfrm>
           <a:prstGeom prst="rect">
             <a:avLst/>
@@ -9354,8 +8242,15 @@
                   </a:schemeClr>
                 </a:solidFill>
               </a:rPr>
-              <a:t>the track has not been added</a:t>
-            </a:r>
+              <a:t>the</a:t>
+            </a:r>
+            <a:endParaRPr lang="en-US" sz="2400" dirty="0" smtClean="0">
+              <a:solidFill>
+                <a:schemeClr val="bg2">
+                  <a:lumMod val="50000"/>
+                </a:schemeClr>
+              </a:solidFill>
+            </a:endParaRPr>
           </a:p>
           <a:p>
             <a:r>
@@ -9376,7 +8271,7 @@
           <a:p>
             <a:r>
               <a:rPr lang="en-US" sz="2400" dirty="0" smtClean="0"/>
-              <a:t>And </a:t>
+              <a:t>Then </a:t>
             </a:r>
             <a:r>
               <a:rPr lang="en-US" sz="2400" dirty="0" smtClean="0">
@@ -9386,13 +8281,7 @@
                   </a:schemeClr>
                 </a:solidFill>
               </a:rPr>
-              <a:t>I click the Create button</a:t>
-            </a:r>
-          </a:p>
-          <a:p>
-            <a:r>
-              <a:rPr lang="en-US" sz="2400" dirty="0" smtClean="0"/>
-              <a:t>Then </a:t>
+              <a:t>I </a:t>
             </a:r>
             <a:r>
               <a:rPr lang="en-US" sz="2400" dirty="0" smtClean="0">
@@ -9402,7 +8291,7 @@
                   </a:schemeClr>
                 </a:solidFill>
               </a:rPr>
-              <a:t>I expect for a track to be added to the site</a:t>
+              <a:t>expect</a:t>
             </a:r>
             <a:endParaRPr lang="en-US" sz="2400" dirty="0" smtClean="0">
               <a:solidFill>
@@ -9438,11 +8327,7 @@
           <a:p>
             <a:r>
               <a:rPr lang="en-US" sz="2400" dirty="0" smtClean="0"/>
-              <a:t>Scenario : </a:t>
-            </a:r>
-            <a:r>
-              <a:rPr lang="en-US" sz="2400" dirty="0" smtClean="0"/>
-              <a:t>Registering</a:t>
+              <a:t>Scenario : Registering</a:t>
             </a:r>
             <a:endParaRPr lang="en-US" sz="2400" dirty="0"/>
           </a:p>
@@ -9457,7 +8342,7 @@
         <p:spPr>
           <a:xfrm>
             <a:off x="524129" y="4602540"/>
-            <a:ext cx="8391271" cy="1569660"/>
+            <a:ext cx="1412694" cy="1200329"/>
           </a:xfrm>
           <a:prstGeom prst="rect">
             <a:avLst/>
@@ -9482,8 +8367,15 @@
                   </a:schemeClr>
                 </a:solidFill>
               </a:rPr>
-              <a:t>the track has already added</a:t>
-            </a:r>
+              <a:t>the</a:t>
+            </a:r>
+            <a:endParaRPr lang="en-US" sz="2400" dirty="0" smtClean="0">
+              <a:solidFill>
+                <a:schemeClr val="bg2">
+                  <a:lumMod val="50000"/>
+                </a:schemeClr>
+              </a:solidFill>
+            </a:endParaRPr>
           </a:p>
           <a:p>
             <a:r>
@@ -9498,13 +8390,20 @@
                   </a:schemeClr>
                 </a:solidFill>
               </a:rPr>
-              <a:t>I type in a track name</a:t>
-            </a:r>
+              <a:t>I</a:t>
+            </a:r>
+            <a:endParaRPr lang="en-US" sz="2400" dirty="0" smtClean="0">
+              <a:solidFill>
+                <a:schemeClr val="bg2">
+                  <a:lumMod val="50000"/>
+                </a:schemeClr>
+              </a:solidFill>
+            </a:endParaRPr>
           </a:p>
           <a:p>
             <a:r>
               <a:rPr lang="en-US" sz="2400" dirty="0" smtClean="0"/>
-              <a:t>And </a:t>
+              <a:t>Then </a:t>
             </a:r>
             <a:r>
               <a:rPr lang="en-US" sz="2400" dirty="0" smtClean="0">
@@ -9514,23 +8413,7 @@
                   </a:schemeClr>
                 </a:solidFill>
               </a:rPr>
-              <a:t>I click the Create button</a:t>
-            </a:r>
-          </a:p>
-          <a:p>
-            <a:r>
-              <a:rPr lang="en-US" sz="2400" dirty="0" smtClean="0"/>
-              <a:t>Then </a:t>
-            </a:r>
-            <a:r>
-              <a:rPr lang="en-US" sz="2400" dirty="0" smtClean="0">
-                <a:solidFill>
-                  <a:schemeClr val="bg2">
-                    <a:lumMod val="50000"/>
-                  </a:schemeClr>
-                </a:solidFill>
-              </a:rPr>
-              <a:t>I expect to see a message stating that track already exists</a:t>
+              <a:t>I</a:t>
             </a:r>
             <a:endParaRPr lang="en-US" sz="2400" dirty="0" smtClean="0">
               <a:solidFill>

</xml_diff>